<commit_message>
docs: updated existing Architecture, Logic, Storage, UI component Class Diagrams
</commit_message>
<xml_diff>
--- a/docs/diagrams/ArchitectureDiagram.pptx
+++ b/docs/diagrams/ArchitectureDiagram.pptx
@@ -107,6 +107,22 @@
       </a:defRPr>
     </a:lvl9pPr>
   </p:defaultTextStyle>
+  <p:extLst>
+    <p:ext uri="{EFAFB233-063F-42B5-8137-9DF3F51BA10A}">
+      <p15:sldGuideLst xmlns:p15="http://schemas.microsoft.com/office/powerpoint/2012/main">
+        <p15:guide id="1" orient="horz" pos="1488">
+          <p15:clr>
+            <a:srgbClr val="A4A3A4"/>
+          </p15:clr>
+        </p15:guide>
+        <p15:guide id="2" pos="2880">
+          <p15:clr>
+            <a:srgbClr val="A4A3A4"/>
+          </p15:clr>
+        </p15:guide>
+      </p15:sldGuideLst>
+    </p:ext>
+  </p:extLst>
 </p:presentation>
 </file>
 
@@ -192,7 +208,7 @@
           <a:p>
             <a:fld id="{F5CC4B3F-88C1-4FFA-B1B6-F41C21DC6924}" type="datetimeFigureOut">
               <a:rPr lang="en-US" smtClean="0"/>
-              <a:t>10/16/2016</a:t>
+              <a:t>10/29/2018</a:t>
             </a:fld>
             <a:endParaRPr lang="en-US"/>
           </a:p>
@@ -256,38 +272,37 @@
           <a:p>
             <a:pPr lvl="0"/>
             <a:r>
-              <a:rPr lang="en-US" smtClean="0"/>
+              <a:rPr lang="en-US"/>
               <a:t>Click to edit Master text styles</a:t>
             </a:r>
           </a:p>
           <a:p>
             <a:pPr lvl="1"/>
             <a:r>
-              <a:rPr lang="en-US" smtClean="0"/>
+              <a:rPr lang="en-US"/>
               <a:t>Second level</a:t>
             </a:r>
           </a:p>
           <a:p>
             <a:pPr lvl="2"/>
             <a:r>
-              <a:rPr lang="en-US" smtClean="0"/>
+              <a:rPr lang="en-US"/>
               <a:t>Third level</a:t>
             </a:r>
           </a:p>
           <a:p>
             <a:pPr lvl="3"/>
             <a:r>
-              <a:rPr lang="en-US" smtClean="0"/>
+              <a:rPr lang="en-US"/>
               <a:t>Fourth level</a:t>
             </a:r>
           </a:p>
           <a:p>
             <a:pPr lvl="4"/>
             <a:r>
-              <a:rPr lang="en-US" smtClean="0"/>
+              <a:rPr lang="en-US"/>
               <a:t>Fifth level</a:t>
             </a:r>
-            <a:endParaRPr lang="en-US"/>
           </a:p>
         </p:txBody>
       </p:sp>
@@ -498,10 +513,9 @@
           <a:lstStyle/>
           <a:p>
             <a:r>
-              <a:rPr lang="en-US" smtClean="0"/>
+              <a:rPr lang="en-US"/>
               <a:t>Click to edit Master title style</a:t>
             </a:r>
-            <a:endParaRPr lang="en-US"/>
           </a:p>
         </p:txBody>
       </p:sp>
@@ -617,10 +631,9 @@
           </a:lstStyle>
           <a:p>
             <a:r>
-              <a:rPr lang="en-US" smtClean="0"/>
+              <a:rPr lang="en-US"/>
               <a:t>Click to edit Master subtitle style</a:t>
             </a:r>
-            <a:endParaRPr lang="en-US"/>
           </a:p>
         </p:txBody>
       </p:sp>
@@ -641,7 +654,7 @@
           <a:p>
             <a:fld id="{78C97017-6FC3-485B-9764-EAC9E56C1D49}" type="datetimeFigureOut">
               <a:rPr lang="en-US" smtClean="0"/>
-              <a:t>10/16/2016</a:t>
+              <a:t>10/29/2018</a:t>
             </a:fld>
             <a:endParaRPr lang="en-US"/>
           </a:p>
@@ -735,10 +748,9 @@
           <a:lstStyle/>
           <a:p>
             <a:r>
-              <a:rPr lang="en-US" smtClean="0"/>
+              <a:rPr lang="en-US"/>
               <a:t>Click to edit Master title style</a:t>
             </a:r>
-            <a:endParaRPr lang="en-US"/>
           </a:p>
         </p:txBody>
       </p:sp>
@@ -759,38 +771,37 @@
           <a:p>
             <a:pPr lvl="0"/>
             <a:r>
-              <a:rPr lang="en-US" smtClean="0"/>
+              <a:rPr lang="en-US"/>
               <a:t>Click to edit Master text styles</a:t>
             </a:r>
           </a:p>
           <a:p>
             <a:pPr lvl="1"/>
             <a:r>
-              <a:rPr lang="en-US" smtClean="0"/>
+              <a:rPr lang="en-US"/>
               <a:t>Second level</a:t>
             </a:r>
           </a:p>
           <a:p>
             <a:pPr lvl="2"/>
             <a:r>
-              <a:rPr lang="en-US" smtClean="0"/>
+              <a:rPr lang="en-US"/>
               <a:t>Third level</a:t>
             </a:r>
           </a:p>
           <a:p>
             <a:pPr lvl="3"/>
             <a:r>
-              <a:rPr lang="en-US" smtClean="0"/>
+              <a:rPr lang="en-US"/>
               <a:t>Fourth level</a:t>
             </a:r>
           </a:p>
           <a:p>
             <a:pPr lvl="4"/>
             <a:r>
-              <a:rPr lang="en-US" smtClean="0"/>
+              <a:rPr lang="en-US"/>
               <a:t>Fifth level</a:t>
             </a:r>
-            <a:endParaRPr lang="en-US"/>
           </a:p>
         </p:txBody>
       </p:sp>
@@ -811,7 +822,7 @@
           <a:p>
             <a:fld id="{78C97017-6FC3-485B-9764-EAC9E56C1D49}" type="datetimeFigureOut">
               <a:rPr lang="en-US" smtClean="0"/>
-              <a:t>10/16/2016</a:t>
+              <a:t>10/29/2018</a:t>
             </a:fld>
             <a:endParaRPr lang="en-US"/>
           </a:p>
@@ -910,10 +921,9 @@
           <a:lstStyle/>
           <a:p>
             <a:r>
-              <a:rPr lang="en-US" smtClean="0"/>
+              <a:rPr lang="en-US"/>
               <a:t>Click to edit Master title style</a:t>
             </a:r>
-            <a:endParaRPr lang="en-US"/>
           </a:p>
         </p:txBody>
       </p:sp>
@@ -939,38 +949,37 @@
           <a:p>
             <a:pPr lvl="0"/>
             <a:r>
-              <a:rPr lang="en-US" smtClean="0"/>
+              <a:rPr lang="en-US"/>
               <a:t>Click to edit Master text styles</a:t>
             </a:r>
           </a:p>
           <a:p>
             <a:pPr lvl="1"/>
             <a:r>
-              <a:rPr lang="en-US" smtClean="0"/>
+              <a:rPr lang="en-US"/>
               <a:t>Second level</a:t>
             </a:r>
           </a:p>
           <a:p>
             <a:pPr lvl="2"/>
             <a:r>
-              <a:rPr lang="en-US" smtClean="0"/>
+              <a:rPr lang="en-US"/>
               <a:t>Third level</a:t>
             </a:r>
           </a:p>
           <a:p>
             <a:pPr lvl="3"/>
             <a:r>
-              <a:rPr lang="en-US" smtClean="0"/>
+              <a:rPr lang="en-US"/>
               <a:t>Fourth level</a:t>
             </a:r>
           </a:p>
           <a:p>
             <a:pPr lvl="4"/>
             <a:r>
-              <a:rPr lang="en-US" smtClean="0"/>
+              <a:rPr lang="en-US"/>
               <a:t>Fifth level</a:t>
             </a:r>
-            <a:endParaRPr lang="en-US"/>
           </a:p>
         </p:txBody>
       </p:sp>
@@ -991,7 +1000,7 @@
           <a:p>
             <a:fld id="{78C97017-6FC3-485B-9764-EAC9E56C1D49}" type="datetimeFigureOut">
               <a:rPr lang="en-US" smtClean="0"/>
-              <a:t>10/16/2016</a:t>
+              <a:t>10/29/2018</a:t>
             </a:fld>
             <a:endParaRPr lang="en-US"/>
           </a:p>
@@ -1085,10 +1094,9 @@
           <a:lstStyle/>
           <a:p>
             <a:r>
-              <a:rPr lang="en-US" smtClean="0"/>
+              <a:rPr lang="en-US"/>
               <a:t>Click to edit Master title style</a:t>
             </a:r>
-            <a:endParaRPr lang="en-US"/>
           </a:p>
         </p:txBody>
       </p:sp>
@@ -1109,38 +1117,37 @@
           <a:p>
             <a:pPr lvl="0"/>
             <a:r>
-              <a:rPr lang="en-US" smtClean="0"/>
+              <a:rPr lang="en-US"/>
               <a:t>Click to edit Master text styles</a:t>
             </a:r>
           </a:p>
           <a:p>
             <a:pPr lvl="1"/>
             <a:r>
-              <a:rPr lang="en-US" smtClean="0"/>
+              <a:rPr lang="en-US"/>
               <a:t>Second level</a:t>
             </a:r>
           </a:p>
           <a:p>
             <a:pPr lvl="2"/>
             <a:r>
-              <a:rPr lang="en-US" smtClean="0"/>
+              <a:rPr lang="en-US"/>
               <a:t>Third level</a:t>
             </a:r>
           </a:p>
           <a:p>
             <a:pPr lvl="3"/>
             <a:r>
-              <a:rPr lang="en-US" smtClean="0"/>
+              <a:rPr lang="en-US"/>
               <a:t>Fourth level</a:t>
             </a:r>
           </a:p>
           <a:p>
             <a:pPr lvl="4"/>
             <a:r>
-              <a:rPr lang="en-US" smtClean="0"/>
+              <a:rPr lang="en-US"/>
               <a:t>Fifth level</a:t>
             </a:r>
-            <a:endParaRPr lang="en-US"/>
           </a:p>
         </p:txBody>
       </p:sp>
@@ -1161,7 +1168,7 @@
           <a:p>
             <a:fld id="{78C97017-6FC3-485B-9764-EAC9E56C1D49}" type="datetimeFigureOut">
               <a:rPr lang="en-US" smtClean="0"/>
-              <a:t>10/16/2016</a:t>
+              <a:t>10/29/2018</a:t>
             </a:fld>
             <a:endParaRPr lang="en-US"/>
           </a:p>
@@ -1264,10 +1271,9 @@
           </a:lstStyle>
           <a:p>
             <a:r>
-              <a:rPr lang="en-US" smtClean="0"/>
+              <a:rPr lang="en-US"/>
               <a:t>Click to edit Master title style</a:t>
             </a:r>
-            <a:endParaRPr lang="en-US"/>
           </a:p>
         </p:txBody>
       </p:sp>
@@ -1384,7 +1390,7 @@
           <a:p>
             <a:pPr lvl="0"/>
             <a:r>
-              <a:rPr lang="en-US" smtClean="0"/>
+              <a:rPr lang="en-US"/>
               <a:t>Click to edit Master text styles</a:t>
             </a:r>
           </a:p>
@@ -1407,7 +1413,7 @@
           <a:p>
             <a:fld id="{78C97017-6FC3-485B-9764-EAC9E56C1D49}" type="datetimeFigureOut">
               <a:rPr lang="en-US" smtClean="0"/>
-              <a:t>10/16/2016</a:t>
+              <a:t>10/29/2018</a:t>
             </a:fld>
             <a:endParaRPr lang="en-US"/>
           </a:p>
@@ -1501,10 +1507,9 @@
           <a:lstStyle/>
           <a:p>
             <a:r>
-              <a:rPr lang="en-US" smtClean="0"/>
+              <a:rPr lang="en-US"/>
               <a:t>Click to edit Master title style</a:t>
             </a:r>
-            <a:endParaRPr lang="en-US"/>
           </a:p>
         </p:txBody>
       </p:sp>
@@ -1558,38 +1563,37 @@
           <a:p>
             <a:pPr lvl="0"/>
             <a:r>
-              <a:rPr lang="en-US" smtClean="0"/>
+              <a:rPr lang="en-US"/>
               <a:t>Click to edit Master text styles</a:t>
             </a:r>
           </a:p>
           <a:p>
             <a:pPr lvl="1"/>
             <a:r>
-              <a:rPr lang="en-US" smtClean="0"/>
+              <a:rPr lang="en-US"/>
               <a:t>Second level</a:t>
             </a:r>
           </a:p>
           <a:p>
             <a:pPr lvl="2"/>
             <a:r>
-              <a:rPr lang="en-US" smtClean="0"/>
+              <a:rPr lang="en-US"/>
               <a:t>Third level</a:t>
             </a:r>
           </a:p>
           <a:p>
             <a:pPr lvl="3"/>
             <a:r>
-              <a:rPr lang="en-US" smtClean="0"/>
+              <a:rPr lang="en-US"/>
               <a:t>Fourth level</a:t>
             </a:r>
           </a:p>
           <a:p>
             <a:pPr lvl="4"/>
             <a:r>
-              <a:rPr lang="en-US" smtClean="0"/>
+              <a:rPr lang="en-US"/>
               <a:t>Fifth level</a:t>
             </a:r>
-            <a:endParaRPr lang="en-US"/>
           </a:p>
         </p:txBody>
       </p:sp>
@@ -1643,38 +1647,37 @@
           <a:p>
             <a:pPr lvl="0"/>
             <a:r>
-              <a:rPr lang="en-US" smtClean="0"/>
+              <a:rPr lang="en-US"/>
               <a:t>Click to edit Master text styles</a:t>
             </a:r>
           </a:p>
           <a:p>
             <a:pPr lvl="1"/>
             <a:r>
-              <a:rPr lang="en-US" smtClean="0"/>
+              <a:rPr lang="en-US"/>
               <a:t>Second level</a:t>
             </a:r>
           </a:p>
           <a:p>
             <a:pPr lvl="2"/>
             <a:r>
-              <a:rPr lang="en-US" smtClean="0"/>
+              <a:rPr lang="en-US"/>
               <a:t>Third level</a:t>
             </a:r>
           </a:p>
           <a:p>
             <a:pPr lvl="3"/>
             <a:r>
-              <a:rPr lang="en-US" smtClean="0"/>
+              <a:rPr lang="en-US"/>
               <a:t>Fourth level</a:t>
             </a:r>
           </a:p>
           <a:p>
             <a:pPr lvl="4"/>
             <a:r>
-              <a:rPr lang="en-US" smtClean="0"/>
+              <a:rPr lang="en-US"/>
               <a:t>Fifth level</a:t>
             </a:r>
-            <a:endParaRPr lang="en-US"/>
           </a:p>
         </p:txBody>
       </p:sp>
@@ -1695,7 +1698,7 @@
           <a:p>
             <a:fld id="{78C97017-6FC3-485B-9764-EAC9E56C1D49}" type="datetimeFigureOut">
               <a:rPr lang="en-US" smtClean="0"/>
-              <a:t>10/16/2016</a:t>
+              <a:t>10/29/2018</a:t>
             </a:fld>
             <a:endParaRPr lang="en-US"/>
           </a:p>
@@ -1793,10 +1796,9 @@
           </a:lstStyle>
           <a:p>
             <a:r>
-              <a:rPr lang="en-US" smtClean="0"/>
+              <a:rPr lang="en-US"/>
               <a:t>Click to edit Master title style</a:t>
             </a:r>
-            <a:endParaRPr lang="en-US"/>
           </a:p>
         </p:txBody>
       </p:sp>
@@ -1859,7 +1861,7 @@
           <a:p>
             <a:pPr lvl="0"/>
             <a:r>
-              <a:rPr lang="en-US" smtClean="0"/>
+              <a:rPr lang="en-US"/>
               <a:t>Click to edit Master text styles</a:t>
             </a:r>
           </a:p>
@@ -1915,38 +1917,37 @@
           <a:p>
             <a:pPr lvl="0"/>
             <a:r>
-              <a:rPr lang="en-US" smtClean="0"/>
+              <a:rPr lang="en-US"/>
               <a:t>Click to edit Master text styles</a:t>
             </a:r>
           </a:p>
           <a:p>
             <a:pPr lvl="1"/>
             <a:r>
-              <a:rPr lang="en-US" smtClean="0"/>
+              <a:rPr lang="en-US"/>
               <a:t>Second level</a:t>
             </a:r>
           </a:p>
           <a:p>
             <a:pPr lvl="2"/>
             <a:r>
-              <a:rPr lang="en-US" smtClean="0"/>
+              <a:rPr lang="en-US"/>
               <a:t>Third level</a:t>
             </a:r>
           </a:p>
           <a:p>
             <a:pPr lvl="3"/>
             <a:r>
-              <a:rPr lang="en-US" smtClean="0"/>
+              <a:rPr lang="en-US"/>
               <a:t>Fourth level</a:t>
             </a:r>
           </a:p>
           <a:p>
             <a:pPr lvl="4"/>
             <a:r>
-              <a:rPr lang="en-US" smtClean="0"/>
+              <a:rPr lang="en-US"/>
               <a:t>Fifth level</a:t>
             </a:r>
-            <a:endParaRPr lang="en-US"/>
           </a:p>
         </p:txBody>
       </p:sp>
@@ -2009,7 +2010,7 @@
           <a:p>
             <a:pPr lvl="0"/>
             <a:r>
-              <a:rPr lang="en-US" smtClean="0"/>
+              <a:rPr lang="en-US"/>
               <a:t>Click to edit Master text styles</a:t>
             </a:r>
           </a:p>
@@ -2065,38 +2066,37 @@
           <a:p>
             <a:pPr lvl="0"/>
             <a:r>
-              <a:rPr lang="en-US" smtClean="0"/>
+              <a:rPr lang="en-US"/>
               <a:t>Click to edit Master text styles</a:t>
             </a:r>
           </a:p>
           <a:p>
             <a:pPr lvl="1"/>
             <a:r>
-              <a:rPr lang="en-US" smtClean="0"/>
+              <a:rPr lang="en-US"/>
               <a:t>Second level</a:t>
             </a:r>
           </a:p>
           <a:p>
             <a:pPr lvl="2"/>
             <a:r>
-              <a:rPr lang="en-US" smtClean="0"/>
+              <a:rPr lang="en-US"/>
               <a:t>Third level</a:t>
             </a:r>
           </a:p>
           <a:p>
             <a:pPr lvl="3"/>
             <a:r>
-              <a:rPr lang="en-US" smtClean="0"/>
+              <a:rPr lang="en-US"/>
               <a:t>Fourth level</a:t>
             </a:r>
           </a:p>
           <a:p>
             <a:pPr lvl="4"/>
             <a:r>
-              <a:rPr lang="en-US" smtClean="0"/>
+              <a:rPr lang="en-US"/>
               <a:t>Fifth level</a:t>
             </a:r>
-            <a:endParaRPr lang="en-US"/>
           </a:p>
         </p:txBody>
       </p:sp>
@@ -2117,7 +2117,7 @@
           <a:p>
             <a:fld id="{78C97017-6FC3-485B-9764-EAC9E56C1D49}" type="datetimeFigureOut">
               <a:rPr lang="en-US" smtClean="0"/>
-              <a:t>10/16/2016</a:t>
+              <a:t>10/29/2018</a:t>
             </a:fld>
             <a:endParaRPr lang="en-US"/>
           </a:p>
@@ -2211,10 +2211,9 @@
           <a:lstStyle/>
           <a:p>
             <a:r>
-              <a:rPr lang="en-US" smtClean="0"/>
+              <a:rPr lang="en-US"/>
               <a:t>Click to edit Master title style</a:t>
             </a:r>
-            <a:endParaRPr lang="en-US"/>
           </a:p>
         </p:txBody>
       </p:sp>
@@ -2235,7 +2234,7 @@
           <a:p>
             <a:fld id="{78C97017-6FC3-485B-9764-EAC9E56C1D49}" type="datetimeFigureOut">
               <a:rPr lang="en-US" smtClean="0"/>
-              <a:t>10/16/2016</a:t>
+              <a:t>10/29/2018</a:t>
             </a:fld>
             <a:endParaRPr lang="en-US"/>
           </a:p>
@@ -2330,7 +2329,7 @@
           <a:p>
             <a:fld id="{78C97017-6FC3-485B-9764-EAC9E56C1D49}" type="datetimeFigureOut">
               <a:rPr lang="en-US" smtClean="0"/>
-              <a:t>10/16/2016</a:t>
+              <a:t>10/29/2018</a:t>
             </a:fld>
             <a:endParaRPr lang="en-US"/>
           </a:p>
@@ -2433,10 +2432,9 @@
           </a:lstStyle>
           <a:p>
             <a:r>
-              <a:rPr lang="en-US" smtClean="0"/>
+              <a:rPr lang="en-US"/>
               <a:t>Click to edit Master title style</a:t>
             </a:r>
-            <a:endParaRPr lang="en-US"/>
           </a:p>
         </p:txBody>
       </p:sp>
@@ -2490,38 +2488,37 @@
           <a:p>
             <a:pPr lvl="0"/>
             <a:r>
-              <a:rPr lang="en-US" smtClean="0"/>
+              <a:rPr lang="en-US"/>
               <a:t>Click to edit Master text styles</a:t>
             </a:r>
           </a:p>
           <a:p>
             <a:pPr lvl="1"/>
             <a:r>
-              <a:rPr lang="en-US" smtClean="0"/>
+              <a:rPr lang="en-US"/>
               <a:t>Second level</a:t>
             </a:r>
           </a:p>
           <a:p>
             <a:pPr lvl="2"/>
             <a:r>
-              <a:rPr lang="en-US" smtClean="0"/>
+              <a:rPr lang="en-US"/>
               <a:t>Third level</a:t>
             </a:r>
           </a:p>
           <a:p>
             <a:pPr lvl="3"/>
             <a:r>
-              <a:rPr lang="en-US" smtClean="0"/>
+              <a:rPr lang="en-US"/>
               <a:t>Fourth level</a:t>
             </a:r>
           </a:p>
           <a:p>
             <a:pPr lvl="4"/>
             <a:r>
-              <a:rPr lang="en-US" smtClean="0"/>
+              <a:rPr lang="en-US"/>
               <a:t>Fifth level</a:t>
             </a:r>
-            <a:endParaRPr lang="en-US"/>
           </a:p>
         </p:txBody>
       </p:sp>
@@ -2584,7 +2581,7 @@
           <a:p>
             <a:pPr lvl="0"/>
             <a:r>
-              <a:rPr lang="en-US" smtClean="0"/>
+              <a:rPr lang="en-US"/>
               <a:t>Click to edit Master text styles</a:t>
             </a:r>
           </a:p>
@@ -2607,7 +2604,7 @@
           <a:p>
             <a:fld id="{78C97017-6FC3-485B-9764-EAC9E56C1D49}" type="datetimeFigureOut">
               <a:rPr lang="en-US" smtClean="0"/>
-              <a:t>10/16/2016</a:t>
+              <a:t>10/29/2018</a:t>
             </a:fld>
             <a:endParaRPr lang="en-US"/>
           </a:p>
@@ -2710,10 +2707,9 @@
           </a:lstStyle>
           <a:p>
             <a:r>
-              <a:rPr lang="en-US" smtClean="0"/>
+              <a:rPr lang="en-US"/>
               <a:t>Click to edit Master title style</a:t>
             </a:r>
-            <a:endParaRPr lang="en-US"/>
           </a:p>
         </p:txBody>
       </p:sp>
@@ -2837,7 +2833,7 @@
           <a:p>
             <a:pPr lvl="0"/>
             <a:r>
-              <a:rPr lang="en-US" smtClean="0"/>
+              <a:rPr lang="en-US"/>
               <a:t>Click to edit Master text styles</a:t>
             </a:r>
           </a:p>
@@ -2860,7 +2856,7 @@
           <a:p>
             <a:fld id="{78C97017-6FC3-485B-9764-EAC9E56C1D49}" type="datetimeFigureOut">
               <a:rPr lang="en-US" smtClean="0"/>
-              <a:t>10/16/2016</a:t>
+              <a:t>10/29/2018</a:t>
             </a:fld>
             <a:endParaRPr lang="en-US"/>
           </a:p>
@@ -2969,10 +2965,9 @@
           <a:lstStyle/>
           <a:p>
             <a:r>
-              <a:rPr lang="en-US" smtClean="0"/>
+              <a:rPr lang="en-US"/>
               <a:t>Click to edit Master title style</a:t>
             </a:r>
-            <a:endParaRPr lang="en-US"/>
           </a:p>
         </p:txBody>
       </p:sp>
@@ -3003,38 +2998,37 @@
           <a:p>
             <a:pPr lvl="0"/>
             <a:r>
-              <a:rPr lang="en-US" smtClean="0"/>
+              <a:rPr lang="en-US"/>
               <a:t>Click to edit Master text styles</a:t>
             </a:r>
           </a:p>
           <a:p>
             <a:pPr lvl="1"/>
             <a:r>
-              <a:rPr lang="en-US" smtClean="0"/>
+              <a:rPr lang="en-US"/>
               <a:t>Second level</a:t>
             </a:r>
           </a:p>
           <a:p>
             <a:pPr lvl="2"/>
             <a:r>
-              <a:rPr lang="en-US" smtClean="0"/>
+              <a:rPr lang="en-US"/>
               <a:t>Third level</a:t>
             </a:r>
           </a:p>
           <a:p>
             <a:pPr lvl="3"/>
             <a:r>
-              <a:rPr lang="en-US" smtClean="0"/>
+              <a:rPr lang="en-US"/>
               <a:t>Fourth level</a:t>
             </a:r>
           </a:p>
           <a:p>
             <a:pPr lvl="4"/>
             <a:r>
-              <a:rPr lang="en-US" smtClean="0"/>
+              <a:rPr lang="en-US"/>
               <a:t>Fifth level</a:t>
             </a:r>
-            <a:endParaRPr lang="en-US"/>
           </a:p>
         </p:txBody>
       </p:sp>
@@ -3073,7 +3067,7 @@
           <a:p>
             <a:fld id="{78C97017-6FC3-485B-9764-EAC9E56C1D49}" type="datetimeFigureOut">
               <a:rPr lang="en-US" smtClean="0"/>
-              <a:t>10/16/2016</a:t>
+              <a:t>10/29/2018</a:t>
             </a:fld>
             <a:endParaRPr lang="en-US"/>
           </a:p>
@@ -3546,7 +3540,7 @@
           <a:p>
             <a:pPr algn="ctr"/>
             <a:r>
-              <a:rPr lang="en-US" sz="1600" dirty="0" smtClean="0">
+              <a:rPr lang="en-US" sz="1600" dirty="0">
                 <a:solidFill>
                   <a:schemeClr val="bg1"/>
                 </a:solidFill>
@@ -3605,7 +3599,7 @@
           <a:p>
             <a:pPr algn="ctr"/>
             <a:r>
-              <a:rPr lang="en-US" sz="1600" dirty="0" smtClean="0">
+              <a:rPr lang="en-US" sz="1600" dirty="0">
                 <a:solidFill>
                   <a:schemeClr val="bg1"/>
                 </a:solidFill>
@@ -3668,7 +3662,7 @@
           <a:p>
             <a:pPr algn="ctr"/>
             <a:r>
-              <a:rPr lang="en-US" sz="1600" dirty="0" smtClean="0">
+              <a:rPr lang="en-US" sz="1600" dirty="0">
                 <a:solidFill>
                   <a:schemeClr val="bg1"/>
                 </a:solidFill>
@@ -3727,7 +3721,7 @@
           <a:p>
             <a:pPr algn="ctr"/>
             <a:r>
-              <a:rPr lang="en-US" sz="1600" dirty="0" smtClean="0">
+              <a:rPr lang="en-US" sz="1600" dirty="0">
                 <a:solidFill>
                   <a:schemeClr val="bg1"/>
                 </a:solidFill>
@@ -4176,101 +4170,6 @@
       </p:sp>
       <p:sp>
         <p:nvSpPr>
-          <p:cNvPr id="51" name="Cloud 50"/>
-          <p:cNvSpPr/>
-          <p:nvPr/>
-        </p:nvSpPr>
-        <p:spPr>
-          <a:xfrm>
-            <a:off x="2650069" y="1447800"/>
-            <a:ext cx="914400" cy="533400"/>
-          </a:xfrm>
-          <a:prstGeom prst="cloud">
-            <a:avLst/>
-          </a:prstGeom>
-          <a:solidFill>
-            <a:schemeClr val="bg1"/>
-          </a:solidFill>
-          <a:ln>
-            <a:solidFill>
-              <a:schemeClr val="tx1"/>
-            </a:solidFill>
-          </a:ln>
-        </p:spPr>
-        <p:style>
-          <a:lnRef idx="2">
-            <a:schemeClr val="accent1">
-              <a:shade val="50000"/>
-            </a:schemeClr>
-          </a:lnRef>
-          <a:fillRef idx="1">
-            <a:schemeClr val="accent1"/>
-          </a:fillRef>
-          <a:effectRef idx="0">
-            <a:schemeClr val="accent1"/>
-          </a:effectRef>
-          <a:fontRef idx="minor">
-            <a:schemeClr val="lt1"/>
-          </a:fontRef>
-        </p:style>
-        <p:txBody>
-          <a:bodyPr rtlCol="0" anchor="ctr"/>
-          <a:lstStyle/>
-          <a:p>
-            <a:pPr algn="ctr"/>
-            <a:r>
-              <a:rPr lang="en-US" sz="1400" dirty="0">
-                <a:solidFill>
-                  <a:schemeClr val="tx1"/>
-                </a:solidFill>
-              </a:rPr>
-              <a:t>Web</a:t>
-            </a:r>
-          </a:p>
-        </p:txBody>
-      </p:sp>
-      <p:cxnSp>
-        <p:nvCxnSpPr>
-          <p:cNvPr id="52" name="Elbow Connector 51"/>
-          <p:cNvCxnSpPr>
-            <a:stCxn id="2" idx="0"/>
-            <a:endCxn id="51" idx="2"/>
-          </p:cNvCxnSpPr>
-          <p:nvPr/>
-        </p:nvCxnSpPr>
-        <p:spPr>
-          <a:xfrm rot="5400000" flipH="1" flipV="1">
-            <a:off x="2222648" y="1760922"/>
-            <a:ext cx="476678" cy="383835"/>
-          </a:xfrm>
-          <a:prstGeom prst="bentConnector2">
-            <a:avLst/>
-          </a:prstGeom>
-          <a:ln w="28575">
-            <a:solidFill>
-              <a:srgbClr val="00B050"/>
-            </a:solidFill>
-            <a:prstDash val="sysDot"/>
-            <a:tailEnd type="arrow"/>
-          </a:ln>
-        </p:spPr>
-        <p:style>
-          <a:lnRef idx="1">
-            <a:schemeClr val="accent1"/>
-          </a:lnRef>
-          <a:fillRef idx="0">
-            <a:schemeClr val="accent1"/>
-          </a:fillRef>
-          <a:effectRef idx="0">
-            <a:schemeClr val="accent1"/>
-          </a:effectRef>
-          <a:fontRef idx="minor">
-            <a:schemeClr val="tx1"/>
-          </a:fontRef>
-        </p:style>
-      </p:cxnSp>
-      <p:sp>
-        <p:nvSpPr>
           <p:cNvPr id="23" name="Rectangle 62"/>
           <p:cNvSpPr/>
           <p:nvPr/>
@@ -4313,7 +4212,7 @@
           <a:p>
             <a:pPr algn="ctr"/>
             <a:r>
-              <a:rPr lang="en-US" sz="1600" dirty="0" smtClean="0">
+              <a:rPr lang="en-US" sz="1600" dirty="0">
                 <a:solidFill>
                   <a:schemeClr val="bg1"/>
                 </a:solidFill>
@@ -4664,7 +4563,7 @@
           <a:p>
             <a:pPr algn="ctr"/>
             <a:r>
-              <a:rPr lang="en-US" sz="1600" dirty="0" smtClean="0">
+              <a:rPr lang="en-US" sz="1600" dirty="0">
                 <a:solidFill>
                   <a:schemeClr val="bg1"/>
                 </a:solidFill>
@@ -4672,25 +4571,20 @@
               <a:t>Logs</a:t>
             </a:r>
             <a:br>
-              <a:rPr lang="en-US" sz="1600" dirty="0" smtClean="0">
+              <a:rPr lang="en-US" sz="1600" dirty="0">
                 <a:solidFill>
                   <a:schemeClr val="bg1"/>
                 </a:solidFill>
               </a:rPr>
             </a:br>
             <a:r>
-              <a:rPr lang="en-US" sz="1600" dirty="0" smtClean="0">
+              <a:rPr lang="en-US" sz="1600" dirty="0">
                 <a:solidFill>
                   <a:schemeClr val="bg1"/>
                 </a:solidFill>
               </a:rPr>
               <a:t>Center</a:t>
             </a:r>
-            <a:endParaRPr lang="en-US" sz="1600" dirty="0">
-              <a:solidFill>
-                <a:schemeClr val="bg1"/>
-              </a:solidFill>
-            </a:endParaRPr>
           </a:p>
         </p:txBody>
       </p:sp>

</xml_diff>